<commit_message>
Update presentation with the feedback
</commit_message>
<xml_diff>
--- a/Presentation/MultiSpider_Presentation.pptx
+++ b/Presentation/MultiSpider_Presentation.pptx
@@ -215,7 +215,7 @@
           <a:p>
             <a:fld id="{8A84F52A-5AE2-4062-AF77-CB63F6320DA2}" type="datetimeFigureOut">
               <a:rPr lang="en-US" smtClean="0"/>
-              <a:t>4/10/2024</a:t>
+              <a:t>4/11/2024</a:t>
             </a:fld>
             <a:endParaRPr lang="en-US"/>
           </a:p>
@@ -800,7 +800,7 @@
           <a:p>
             <a:fld id="{84196782-5064-4F60-81B4-A0AB91B324D3}" type="datetimeFigureOut">
               <a:rPr lang="el-GR" smtClean="0"/>
-              <a:t>10/4/2024</a:t>
+              <a:t>11/4/2024</a:t>
             </a:fld>
             <a:endParaRPr lang="el-GR"/>
           </a:p>
@@ -1000,7 +1000,7 @@
           <a:p>
             <a:fld id="{84196782-5064-4F60-81B4-A0AB91B324D3}" type="datetimeFigureOut">
               <a:rPr lang="el-GR" smtClean="0"/>
-              <a:t>10/4/2024</a:t>
+              <a:t>11/4/2024</a:t>
             </a:fld>
             <a:endParaRPr lang="el-GR"/>
           </a:p>
@@ -1210,7 +1210,7 @@
           <a:p>
             <a:fld id="{84196782-5064-4F60-81B4-A0AB91B324D3}" type="datetimeFigureOut">
               <a:rPr lang="el-GR" smtClean="0"/>
-              <a:t>10/4/2024</a:t>
+              <a:t>11/4/2024</a:t>
             </a:fld>
             <a:endParaRPr lang="el-GR"/>
           </a:p>
@@ -1410,7 +1410,7 @@
           <a:p>
             <a:fld id="{84196782-5064-4F60-81B4-A0AB91B324D3}" type="datetimeFigureOut">
               <a:rPr lang="el-GR" smtClean="0"/>
-              <a:t>10/4/2024</a:t>
+              <a:t>11/4/2024</a:t>
             </a:fld>
             <a:endParaRPr lang="el-GR"/>
           </a:p>
@@ -1686,7 +1686,7 @@
           <a:p>
             <a:fld id="{84196782-5064-4F60-81B4-A0AB91B324D3}" type="datetimeFigureOut">
               <a:rPr lang="el-GR" smtClean="0"/>
-              <a:t>10/4/2024</a:t>
+              <a:t>11/4/2024</a:t>
             </a:fld>
             <a:endParaRPr lang="el-GR"/>
           </a:p>
@@ -1954,7 +1954,7 @@
           <a:p>
             <a:fld id="{84196782-5064-4F60-81B4-A0AB91B324D3}" type="datetimeFigureOut">
               <a:rPr lang="el-GR" smtClean="0"/>
-              <a:t>10/4/2024</a:t>
+              <a:t>11/4/2024</a:t>
             </a:fld>
             <a:endParaRPr lang="el-GR"/>
           </a:p>
@@ -2369,7 +2369,7 @@
           <a:p>
             <a:fld id="{84196782-5064-4F60-81B4-A0AB91B324D3}" type="datetimeFigureOut">
               <a:rPr lang="el-GR" smtClean="0"/>
-              <a:t>10/4/2024</a:t>
+              <a:t>11/4/2024</a:t>
             </a:fld>
             <a:endParaRPr lang="el-GR"/>
           </a:p>
@@ -2511,7 +2511,7 @@
           <a:p>
             <a:fld id="{84196782-5064-4F60-81B4-A0AB91B324D3}" type="datetimeFigureOut">
               <a:rPr lang="el-GR" smtClean="0"/>
-              <a:t>10/4/2024</a:t>
+              <a:t>11/4/2024</a:t>
             </a:fld>
             <a:endParaRPr lang="el-GR"/>
           </a:p>
@@ -2624,7 +2624,7 @@
           <a:p>
             <a:fld id="{84196782-5064-4F60-81B4-A0AB91B324D3}" type="datetimeFigureOut">
               <a:rPr lang="el-GR" smtClean="0"/>
-              <a:t>10/4/2024</a:t>
+              <a:t>11/4/2024</a:t>
             </a:fld>
             <a:endParaRPr lang="el-GR"/>
           </a:p>
@@ -2937,7 +2937,7 @@
           <a:p>
             <a:fld id="{84196782-5064-4F60-81B4-A0AB91B324D3}" type="datetimeFigureOut">
               <a:rPr lang="el-GR" smtClean="0"/>
-              <a:t>10/4/2024</a:t>
+              <a:t>11/4/2024</a:t>
             </a:fld>
             <a:endParaRPr lang="el-GR"/>
           </a:p>
@@ -3226,7 +3226,7 @@
           <a:p>
             <a:fld id="{84196782-5064-4F60-81B4-A0AB91B324D3}" type="datetimeFigureOut">
               <a:rPr lang="el-GR" smtClean="0"/>
-              <a:t>10/4/2024</a:t>
+              <a:t>11/4/2024</a:t>
             </a:fld>
             <a:endParaRPr lang="el-GR"/>
           </a:p>
@@ -3469,7 +3469,7 @@
           <a:p>
             <a:fld id="{84196782-5064-4F60-81B4-A0AB91B324D3}" type="datetimeFigureOut">
               <a:rPr lang="el-GR" smtClean="0"/>
-              <a:t>10/4/2024</a:t>
+              <a:t>11/4/2024</a:t>
             </a:fld>
             <a:endParaRPr lang="el-GR"/>
           </a:p>
@@ -5290,7 +5290,7 @@
         </p:spPr>
         <p:txBody>
           <a:bodyPr>
-            <a:normAutofit fontScale="85000" lnSpcReduction="20000"/>
+            <a:normAutofit fontScale="70000" lnSpcReduction="20000"/>
           </a:bodyPr>
           <a:lstStyle/>
           <a:p>
@@ -5320,7 +5320,7 @@
             </a:r>
             <a:r>
               <a:rPr lang="en-US" dirty="0"/>
-              <a:t> Implementation (?)</a:t>
+              <a:t> Implementation (?) second phase</a:t>
             </a:r>
           </a:p>
           <a:p>
@@ -5346,15 +5346,14 @@
           <a:p>
             <a:pPr lvl="1"/>
             <a:r>
-              <a:rPr lang="en-US"/>
+              <a:rPr lang="en-US" dirty="0"/>
               <a:t>Zero-Shot ✅ (Translate-then-Train ?)</a:t>
             </a:r>
-            <a:endParaRPr lang="en-US" dirty="0"/>
-          </a:p>
-          <a:p>
-            <a:r>
-              <a:rPr lang="en-US" dirty="0"/>
-              <a:t>Benchmarking Tools</a:t>
+          </a:p>
+          <a:p>
+            <a:r>
+              <a:rPr lang="en-US" dirty="0"/>
+              <a:t>Benchmarking Tools // in each epoch I save a checkpoint</a:t>
             </a:r>
           </a:p>
           <a:p>
@@ -5420,7 +5419,25 @@
             </a:r>
             <a:r>
               <a:rPr lang="en-US" dirty="0"/>
-              <a:t> (???)</a:t>
+              <a:t> (???) with finetuning</a:t>
+            </a:r>
+          </a:p>
+          <a:p>
+            <a:r>
+              <a:rPr lang="en-US" dirty="0" err="1"/>
+              <a:t>BackUp</a:t>
+            </a:r>
+            <a:r>
+              <a:rPr lang="en-US" dirty="0"/>
+              <a:t>: Some </a:t>
+            </a:r>
+            <a:r>
+              <a:rPr lang="en-US" dirty="0" err="1"/>
+              <a:t>gpt</a:t>
+            </a:r>
+            <a:r>
+              <a:rPr lang="en-US" dirty="0"/>
+              <a:t> model with prompt engineering, with question &amp; schema</a:t>
             </a:r>
           </a:p>
           <a:p>

</xml_diff>

<commit_message>
Alter some comments in the presentation
</commit_message>
<xml_diff>
--- a/Presentation/MultiSpider_Presentation.pptx
+++ b/Presentation/MultiSpider_Presentation.pptx
@@ -624,7 +624,7 @@
           <a:p>
             <a:r>
               <a:rPr lang="en-US" dirty="0"/>
-              <a:t>The </a:t>
+              <a:t>Regarding the effect of </a:t>
             </a:r>
             <a:r>
               <a:rPr lang="en-US" dirty="0" err="1"/>
@@ -632,7 +632,7 @@
             </a:r>
             <a:r>
               <a:rPr lang="en-US" dirty="0"/>
-              <a:t> framework increased performance by an average of around 1.8% in exact accuracy across all languages. This improvement is attributed to </a:t>
+              <a:t>, the framework increased performance by an average of around 1.8% in exact accuracy across all languages. This improvement is attributed to </a:t>
             </a:r>
             <a:r>
               <a:rPr lang="en-US" dirty="0" err="1"/>
@@ -998,7 +998,7 @@
           <a:p>
             <a:r>
               <a:rPr lang="en-US" dirty="0"/>
-              <a:t>What about text-to-SQL datasets that are not in English? Generally, such datasets exist, but their translations are often described as poor and incomplete. This work aims to expand the Spider dataset to include seven mainstream languages: German, French, Spanish, Chinese, Japanese, Vietnamese and to introduce a novel schema augmentation method called </a:t>
+              <a:t>What about text-to-SQL datasets that are not in English? Generally, such datasets exist, but their translations are often described as poor and incomplete. This work aims to expand the Spider dataset to include seven mainstream languages: German, French, Spanish, Chinese, Japanese, Vietnamese. The work is also introduces a novel schema augmentation method called </a:t>
             </a:r>
             <a:r>
               <a:rPr lang="en-US" dirty="0" err="1"/>
@@ -1108,17 +1108,7 @@
               <a:rPr lang="en-US" sz="1800" b="0" i="0" u="none" strike="noStrike" baseline="0" dirty="0">
                 <a:latin typeface="NimbusRomNo9L-Regu"/>
               </a:rPr>
-              <a:t>the lexical and structural challenges are further enhanced in </a:t>
-            </a:r>
-            <a:r>
-              <a:rPr lang="en-US" sz="1800" dirty="0" err="1"/>
-              <a:t>MultiSpider</a:t>
-            </a:r>
-            <a:r>
-              <a:rPr lang="en-US" sz="1800" b="0" i="0" u="none" strike="noStrike" baseline="0" dirty="0">
-                <a:latin typeface="NimbusRomNo9L-Regu"/>
-              </a:rPr>
-              <a:t> due to specific language properties.</a:t>
+              <a:t>the lexical and structural challenges are further enhanced due to specific language properties.</a:t>
             </a:r>
             <a:endParaRPr lang="en-US" dirty="0"/>
           </a:p>
@@ -1295,7 +1285,7 @@
           <a:p>
             <a:r>
               <a:rPr lang="en-US" dirty="0"/>
-              <a:t>For the experimental results, the Exact Match Accuracy metric was used, which measures the percentage of queries for which the generated SQL query exactly matches the ground truth SQL query. In the monolingual training (using only target language training data), we observe that Rat-SQL with XLM-R outperformed the MBART performance both with and without the </a:t>
+              <a:t>For the experimental results, the Exact Match Accuracy metric was used. The metric measures the percentage of queries for which the generated SQL query exactly matches the ground truth SQL query. In the monolingual training (using only target language training data), we observe that Rat-SQL with XLM-R outperformed the MBART performance both with and without the </a:t>
             </a:r>
             <a:r>
               <a:rPr lang="en-US" dirty="0" err="1"/>
@@ -1311,7 +1301,7 @@
             </a:r>
             <a:r>
               <a:rPr lang="en-US" dirty="0"/>
-              <a:t>. Similarly, in the multilingual training (using training data from multiple languages), the corresponding result was 66.7%. It is noteworthy here that the </a:t>
+              <a:t>. Similarly, in the multilingual training (using training data from multiple languages), the corresponding result was 66.7%. It is noteworthy here that train the model with the concatenation of the data in all languages enhance its performance. Also, the </a:t>
             </a:r>
             <a:r>
               <a:rPr lang="en-US" dirty="0" err="1"/>
@@ -1408,7 +1398,7 @@
             <a:pPr algn="l"/>
             <a:r>
               <a:rPr lang="en-US" dirty="0"/>
-              <a:t>Regarding the zero-shot setting, we can observe that performance largely depends on the choice of pre-trained encoder, where a better model enables better zero-shot transfer. It is also evident that direct prediction yields better performance than translate-then-predict, since machine translation might introduce errors, especially in schema translation. Finally, it can be seen that with a strong pretrained language model and machine translation model, the translate-then-train-then-predict setting receives promising results.</a:t>
+              <a:t>Regarding the zero-shot setting, we can observe that performance largely depends on the choice of pre-trained encoder, where a better model enables better zero-shot transfer. It is also evident that direct prediction yields better performance than translate-then-predict, since machine translation might introduce errors, especially in schema translation. Finally, it can be seen that with a strong pretrained language model and machine translation model, the translate-then-train setting receives promising results.</a:t>
             </a:r>
             <a:endParaRPr lang="el-GR" dirty="0"/>
           </a:p>

</xml_diff>